<commit_message>
Presentation slide + URL_Link
</commit_message>
<xml_diff>
--- a/DOCUMENTS/Car_In_Us.pptx
+++ b/DOCUMENTS/Car_In_Us.pptx
@@ -29018,7 +29018,9 @@
       </p:grpSpPr>
       <p:sp>
         <p:nvSpPr>
-          <p:cNvPr id="7" name="모서리가 둥근 직사각형 6"/>
+          <p:cNvPr id="7" name="모서리가 둥근 직사각형 6">
+            <a:hlinkClick r:id="rId2" action="ppaction://hlinksldjump"/>
+          </p:cNvPr>
           <p:cNvSpPr/>
           <p:nvPr/>
         </p:nvSpPr>
@@ -29478,6 +29480,68 @@
               <a:cs typeface="Arial"/>
               <a:sym typeface="Arial"/>
             </a:endParaRPr>
+          </a:p>
+        </p:txBody>
+      </p:sp>
+      <p:sp>
+        <p:nvSpPr>
+          <p:cNvPr id="2" name="TextBox 1"/>
+          <p:cNvSpPr txBox="1"/>
+          <p:nvPr/>
+        </p:nvSpPr>
+        <p:spPr>
+          <a:xfrm>
+            <a:off x="1572818" y="2495330"/>
+            <a:ext cx="6552279" cy="1384995"/>
+          </a:xfrm>
+          <a:prstGeom prst="rect">
+            <a:avLst/>
+          </a:prstGeom>
+          <a:noFill/>
+        </p:spPr>
+        <p:txBody>
+          <a:bodyPr wrap="square" rtlCol="0">
+            <a:spAutoFit/>
+          </a:bodyPr>
+          <a:lstStyle/>
+          <a:p>
+            <a:r>
+              <a:rPr lang="en-US" altLang="ko-KR" sz="2800" dirty="0">
+                <a:hlinkClick r:id="rId3"/>
+              </a:rPr>
+              <a:t>https://www.youtube.com/watch?v=mZtRV7dNnOs&amp;index=1&amp;list=PLopuj4BSl_BImxinl9C7TixCnHMVykahT</a:t>
+            </a:r>
+            <a:endParaRPr lang="ko-KR" altLang="en-US" sz="2800" dirty="0"/>
+          </a:p>
+        </p:txBody>
+      </p:sp>
+      <p:sp>
+        <p:nvSpPr>
+          <p:cNvPr id="3" name="TextBox 2"/>
+          <p:cNvSpPr txBox="1"/>
+          <p:nvPr/>
+        </p:nvSpPr>
+        <p:spPr>
+          <a:xfrm>
+            <a:off x="1572818" y="1545781"/>
+            <a:ext cx="2799345" cy="707886"/>
+          </a:xfrm>
+          <a:prstGeom prst="rect">
+            <a:avLst/>
+          </a:prstGeom>
+          <a:noFill/>
+        </p:spPr>
+        <p:txBody>
+          <a:bodyPr wrap="square" rtlCol="0">
+            <a:spAutoFit/>
+          </a:bodyPr>
+          <a:lstStyle/>
+          <a:p>
+            <a:r>
+              <a:rPr lang="en-US" altLang="ko-KR" sz="4000" dirty="0" smtClean="0"/>
+              <a:t>URL_Link :</a:t>
+            </a:r>
+            <a:endParaRPr lang="ko-KR" altLang="en-US" sz="4000" dirty="0"/>
           </a:p>
         </p:txBody>
       </p:sp>
@@ -30043,6 +30107,68 @@
               <a:t>초음파 실행화면</a:t>
             </a:r>
             <a:endParaRPr lang="en-US" dirty="0"/>
+          </a:p>
+        </p:txBody>
+      </p:sp>
+      <p:sp>
+        <p:nvSpPr>
+          <p:cNvPr id="6" name="TextBox 5"/>
+          <p:cNvSpPr txBox="1"/>
+          <p:nvPr/>
+        </p:nvSpPr>
+        <p:spPr>
+          <a:xfrm>
+            <a:off x="1572818" y="1545781"/>
+            <a:ext cx="2799345" cy="707886"/>
+          </a:xfrm>
+          <a:prstGeom prst="rect">
+            <a:avLst/>
+          </a:prstGeom>
+          <a:noFill/>
+        </p:spPr>
+        <p:txBody>
+          <a:bodyPr wrap="square" rtlCol="0">
+            <a:spAutoFit/>
+          </a:bodyPr>
+          <a:lstStyle/>
+          <a:p>
+            <a:r>
+              <a:rPr lang="en-US" altLang="ko-KR" sz="4000" dirty="0" smtClean="0"/>
+              <a:t>URL_Link :</a:t>
+            </a:r>
+            <a:endParaRPr lang="ko-KR" altLang="en-US" sz="4000" dirty="0"/>
+          </a:p>
+        </p:txBody>
+      </p:sp>
+      <p:sp>
+        <p:nvSpPr>
+          <p:cNvPr id="9" name="TextBox 8"/>
+          <p:cNvSpPr txBox="1"/>
+          <p:nvPr/>
+        </p:nvSpPr>
+        <p:spPr>
+          <a:xfrm>
+            <a:off x="1572818" y="2495330"/>
+            <a:ext cx="6552279" cy="1384995"/>
+          </a:xfrm>
+          <a:prstGeom prst="rect">
+            <a:avLst/>
+          </a:prstGeom>
+          <a:noFill/>
+        </p:spPr>
+        <p:txBody>
+          <a:bodyPr wrap="square" rtlCol="0">
+            <a:spAutoFit/>
+          </a:bodyPr>
+          <a:lstStyle/>
+          <a:p>
+            <a:r>
+              <a:rPr lang="en-US" altLang="ko-KR" sz="2800" dirty="0">
+                <a:hlinkClick r:id="rId2" action="ppaction://hlinksldjump"/>
+              </a:rPr>
+              <a:t>https://www.youtube.com/watch?v=KNyswvB_xVg&amp;index=2&amp;list=PLopuj4BSl_BImxinl9C7TixCnHMVykahT</a:t>
+            </a:r>
+            <a:endParaRPr lang="ko-KR" altLang="en-US" sz="2800" dirty="0"/>
           </a:p>
         </p:txBody>
       </p:sp>

</xml_diff>